<commit_message>
slides added in the ppt
</commit_message>
<xml_diff>
--- a/PresentazioneOfficial.pptx
+++ b/PresentazioneOfficial.pptx
@@ -7,6 +7,12 @@
   <p:sldIdLst>
     <p:sldId id="256" r:id="rId2"/>
     <p:sldId id="257" r:id="rId3"/>
+    <p:sldId id="258" r:id="rId4"/>
+    <p:sldId id="260" r:id="rId5"/>
+    <p:sldId id="261" r:id="rId6"/>
+    <p:sldId id="262" r:id="rId7"/>
+    <p:sldId id="263" r:id="rId8"/>
+    <p:sldId id="264" r:id="rId9"/>
   </p:sldIdLst>
   <p:sldSz cx="12192000" cy="6858000"/>
   <p:notesSz cx="6858000" cy="9144000"/>
@@ -105,6 +111,11 @@
       </a:defRPr>
     </a:lvl9pPr>
   </p:defaultTextStyle>
+  <p:extLst>
+    <p:ext uri="{EFAFB233-063F-42B5-8137-9DF3F51BA10A}">
+      <p15:sldGuideLst xmlns:p15="http://schemas.microsoft.com/office/powerpoint/2012/main"/>
+    </p:ext>
+  </p:extLst>
 </p:presentation>
 </file>
 
@@ -300,7 +311,7 @@
             <a:fld id="{B61BEF0D-F0BB-DE4B-95CE-6DB70DBA9567}" type="datetimeFigureOut">
               <a:rPr lang="en-US" dirty="0"/>
               <a:pPr/>
-              <a:t>1/17/2024</a:t>
+              <a:t>1/18/2024</a:t>
             </a:fld>
             <a:endParaRPr lang="en-US" dirty="0"/>
           </a:p>
@@ -733,7 +744,7 @@
             <a:fld id="{B61BEF0D-F0BB-DE4B-95CE-6DB70DBA9567}" type="datetimeFigureOut">
               <a:rPr lang="en-US" dirty="0"/>
               <a:pPr/>
-              <a:t>1/17/2024</a:t>
+              <a:t>1/18/2024</a:t>
             </a:fld>
             <a:endParaRPr lang="en-US" dirty="0"/>
           </a:p>
@@ -980,7 +991,7 @@
             <a:fld id="{B61BEF0D-F0BB-DE4B-95CE-6DB70DBA9567}" type="datetimeFigureOut">
               <a:rPr lang="en-US" dirty="0"/>
               <a:pPr/>
-              <a:t>1/17/2024</a:t>
+              <a:t>1/18/2024</a:t>
             </a:fld>
             <a:endParaRPr lang="en-US" dirty="0"/>
           </a:p>
@@ -1285,7 +1296,7 @@
             <a:fld id="{B61BEF0D-F0BB-DE4B-95CE-6DB70DBA9567}" type="datetimeFigureOut">
               <a:rPr lang="en-US" dirty="0"/>
               <a:pPr/>
-              <a:t>1/17/2024</a:t>
+              <a:t>1/18/2024</a:t>
             </a:fld>
             <a:endParaRPr lang="en-US" dirty="0"/>
           </a:p>
@@ -1600,7 +1611,7 @@
             <a:fld id="{B61BEF0D-F0BB-DE4B-95CE-6DB70DBA9567}" type="datetimeFigureOut">
               <a:rPr lang="en-US" dirty="0"/>
               <a:pPr/>
-              <a:t>1/17/2024</a:t>
+              <a:t>1/18/2024</a:t>
             </a:fld>
             <a:endParaRPr lang="en-US" dirty="0"/>
           </a:p>
@@ -1899,7 +1910,7 @@
             <a:fld id="{B61BEF0D-F0BB-DE4B-95CE-6DB70DBA9567}" type="datetimeFigureOut">
               <a:rPr lang="en-US" dirty="0"/>
               <a:pPr/>
-              <a:t>1/17/2024</a:t>
+              <a:t>1/18/2024</a:t>
             </a:fld>
             <a:endParaRPr lang="en-US" dirty="0"/>
           </a:p>
@@ -2263,7 +2274,7 @@
             <a:fld id="{B61BEF0D-F0BB-DE4B-95CE-6DB70DBA9567}" type="datetimeFigureOut">
               <a:rPr lang="en-US" dirty="0"/>
               <a:pPr/>
-              <a:t>1/17/2024</a:t>
+              <a:t>1/18/2024</a:t>
             </a:fld>
             <a:endParaRPr lang="en-US" dirty="0"/>
           </a:p>
@@ -2434,7 +2445,7 @@
             <a:fld id="{B61BEF0D-F0BB-DE4B-95CE-6DB70DBA9567}" type="datetimeFigureOut">
               <a:rPr lang="en-US" dirty="0"/>
               <a:pPr/>
-              <a:t>1/17/2024</a:t>
+              <a:t>1/18/2024</a:t>
             </a:fld>
             <a:endParaRPr lang="en-US" dirty="0"/>
           </a:p>
@@ -2611,7 +2622,7 @@
             <a:fld id="{B61BEF0D-F0BB-DE4B-95CE-6DB70DBA9567}" type="datetimeFigureOut">
               <a:rPr lang="en-US" dirty="0"/>
               <a:pPr/>
-              <a:t>1/17/2024</a:t>
+              <a:t>1/18/2024</a:t>
             </a:fld>
             <a:endParaRPr lang="en-US" dirty="0"/>
           </a:p>
@@ -2778,7 +2789,7 @@
             <a:fld id="{B61BEF0D-F0BB-DE4B-95CE-6DB70DBA9567}" type="datetimeFigureOut">
               <a:rPr lang="en-US" dirty="0"/>
               <a:pPr/>
-              <a:t>1/17/2024</a:t>
+              <a:t>1/18/2024</a:t>
             </a:fld>
             <a:endParaRPr lang="en-US" dirty="0"/>
           </a:p>
@@ -3025,7 +3036,7 @@
             <a:fld id="{B61BEF0D-F0BB-DE4B-95CE-6DB70DBA9567}" type="datetimeFigureOut">
               <a:rPr lang="en-US" dirty="0"/>
               <a:pPr/>
-              <a:t>1/17/2024</a:t>
+              <a:t>1/18/2024</a:t>
             </a:fld>
             <a:endParaRPr lang="en-US" dirty="0"/>
           </a:p>
@@ -3258,7 +3269,7 @@
             <a:fld id="{B61BEF0D-F0BB-DE4B-95CE-6DB70DBA9567}" type="datetimeFigureOut">
               <a:rPr lang="en-US" dirty="0"/>
               <a:pPr/>
-              <a:t>1/17/2024</a:t>
+              <a:t>1/18/2024</a:t>
             </a:fld>
             <a:endParaRPr lang="en-US" dirty="0"/>
           </a:p>
@@ -3637,7 +3648,7 @@
             <a:fld id="{B61BEF0D-F0BB-DE4B-95CE-6DB70DBA9567}" type="datetimeFigureOut">
               <a:rPr lang="en-US" dirty="0"/>
               <a:pPr/>
-              <a:t>1/17/2024</a:t>
+              <a:t>1/18/2024</a:t>
             </a:fld>
             <a:endParaRPr lang="en-US" dirty="0"/>
           </a:p>
@@ -3752,7 +3763,7 @@
             <a:fld id="{B61BEF0D-F0BB-DE4B-95CE-6DB70DBA9567}" type="datetimeFigureOut">
               <a:rPr lang="en-US" dirty="0"/>
               <a:pPr/>
-              <a:t>1/17/2024</a:t>
+              <a:t>1/18/2024</a:t>
             </a:fld>
             <a:endParaRPr lang="en-US" dirty="0"/>
           </a:p>
@@ -3844,7 +3855,7 @@
             <a:fld id="{B61BEF0D-F0BB-DE4B-95CE-6DB70DBA9567}" type="datetimeFigureOut">
               <a:rPr lang="en-US" dirty="0"/>
               <a:pPr/>
-              <a:t>1/17/2024</a:t>
+              <a:t>1/18/2024</a:t>
             </a:fld>
             <a:endParaRPr lang="en-US" dirty="0"/>
           </a:p>
@@ -4096,7 +4107,7 @@
             <a:fld id="{B61BEF0D-F0BB-DE4B-95CE-6DB70DBA9567}" type="datetimeFigureOut">
               <a:rPr lang="en-US" dirty="0"/>
               <a:pPr/>
-              <a:t>1/17/2024</a:t>
+              <a:t>1/18/2024</a:t>
             </a:fld>
             <a:endParaRPr lang="en-US" dirty="0"/>
           </a:p>
@@ -4376,7 +4387,7 @@
             <a:fld id="{B61BEF0D-F0BB-DE4B-95CE-6DB70DBA9567}" type="datetimeFigureOut">
               <a:rPr lang="en-US" dirty="0"/>
               <a:pPr/>
-              <a:t>1/17/2024</a:t>
+              <a:t>1/18/2024</a:t>
             </a:fld>
             <a:endParaRPr lang="en-US" dirty="0"/>
           </a:p>
@@ -4779,7 +4790,7 @@
             <a:fld id="{B61BEF0D-F0BB-DE4B-95CE-6DB70DBA9567}" type="datetimeFigureOut">
               <a:rPr lang="en-US" dirty="0"/>
               <a:pPr/>
-              <a:t>1/17/2024</a:t>
+              <a:t>1/18/2024</a:t>
             </a:fld>
             <a:endParaRPr lang="en-US" dirty="0"/>
           </a:p>
@@ -5557,6 +5568,849 @@
 </p:sld>
 </file>
 
+<file path=ppt/slides/slide3.xml><?xml version="1.0" encoding="utf-8"?>
+<p:sld xmlns:a="http://schemas.openxmlformats.org/drawingml/2006/main" xmlns:r="http://schemas.openxmlformats.org/officeDocument/2006/relationships" xmlns:p="http://schemas.openxmlformats.org/presentationml/2006/main">
+  <p:cSld>
+    <p:spTree>
+      <p:nvGrpSpPr>
+        <p:cNvPr id="1" name=""/>
+        <p:cNvGrpSpPr/>
+        <p:nvPr/>
+      </p:nvGrpSpPr>
+      <p:grpSpPr>
+        <a:xfrm>
+          <a:off x="0" y="0"/>
+          <a:ext cx="0" cy="0"/>
+          <a:chOff x="0" y="0"/>
+          <a:chExt cx="0" cy="0"/>
+        </a:xfrm>
+      </p:grpSpPr>
+      <p:pic>
+        <p:nvPicPr>
+          <p:cNvPr id="4" name="Segnaposto contenuto 3"/>
+          <p:cNvPicPr>
+            <a:picLocks noGrp="1" noChangeAspect="1"/>
+          </p:cNvPicPr>
+          <p:nvPr>
+            <p:ph idx="1"/>
+          </p:nvPr>
+        </p:nvPicPr>
+        <p:blipFill>
+          <a:blip r:embed="rId2">
+            <a:extLst>
+              <a:ext uri="{28A0092B-C50C-407E-A947-70E740481C1C}">
+                <a14:useLocalDpi xmlns:a14="http://schemas.microsoft.com/office/drawing/2010/main" val="0"/>
+              </a:ext>
+            </a:extLst>
+          </a:blip>
+          <a:stretch>
+            <a:fillRect/>
+          </a:stretch>
+        </p:blipFill>
+        <p:spPr>
+          <a:xfrm>
+            <a:off x="5152294" y="837431"/>
+            <a:ext cx="6655494" cy="5232181"/>
+          </a:xfrm>
+        </p:spPr>
+      </p:pic>
+      <p:sp>
+        <p:nvSpPr>
+          <p:cNvPr id="5" name="CasellaDiTesto 4"/>
+          <p:cNvSpPr txBox="1"/>
+          <p:nvPr/>
+        </p:nvSpPr>
+        <p:spPr>
+          <a:xfrm>
+            <a:off x="685800" y="1419955"/>
+            <a:ext cx="3780692" cy="4154984"/>
+          </a:xfrm>
+          <a:prstGeom prst="rect">
+            <a:avLst/>
+          </a:prstGeom>
+          <a:noFill/>
+        </p:spPr>
+        <p:txBody>
+          <a:bodyPr wrap="square" rtlCol="0">
+            <a:spAutoFit/>
+          </a:bodyPr>
+          <a:lstStyle/>
+          <a:p>
+            <a:r>
+              <a:rPr lang="it-IT" sz="2400" dirty="0" smtClean="0"/>
+              <a:t>Stato di scelta dei dadi</a:t>
+            </a:r>
+          </a:p>
+          <a:p>
+            <a:endParaRPr lang="it-IT" sz="2400" dirty="0" smtClean="0"/>
+          </a:p>
+          <a:p>
+            <a:endParaRPr lang="it-IT" sz="2400" dirty="0"/>
+          </a:p>
+          <a:p>
+            <a:pPr marL="285750" indent="-285750">
+              <a:buFont typeface="Arial" panose="020B0604020202020204" pitchFamily="34" charset="0"/>
+              <a:buChar char="•"/>
+            </a:pPr>
+            <a:r>
+              <a:rPr lang="it-IT" sz="2400" dirty="0" smtClean="0"/>
+              <a:t>Inclinazione della scheda verso destra per incrementare  </a:t>
+            </a:r>
+            <a:endParaRPr lang="it-IT" sz="2400" dirty="0"/>
+          </a:p>
+          <a:p>
+            <a:endParaRPr lang="it-IT" sz="2400" dirty="0" smtClean="0"/>
+          </a:p>
+          <a:p>
+            <a:endParaRPr lang="it-IT" sz="2400" dirty="0" smtClean="0"/>
+          </a:p>
+          <a:p>
+            <a:pPr marL="285750" indent="-285750">
+              <a:buFont typeface="Arial" panose="020B0604020202020204" pitchFamily="34" charset="0"/>
+              <a:buChar char="•"/>
+            </a:pPr>
+            <a:r>
+              <a:rPr lang="it-IT" sz="2400" dirty="0" smtClean="0"/>
+              <a:t>Inclinazione della scheda verso sinistra per decrementare</a:t>
+            </a:r>
+            <a:endParaRPr lang="it-IT" sz="2400" dirty="0"/>
+          </a:p>
+        </p:txBody>
+      </p:sp>
+      <p:sp>
+        <p:nvSpPr>
+          <p:cNvPr id="6" name="Rettangolo 5"/>
+          <p:cNvSpPr/>
+          <p:nvPr/>
+        </p:nvSpPr>
+        <p:spPr>
+          <a:xfrm>
+            <a:off x="305332" y="606599"/>
+            <a:ext cx="4541628" cy="461665"/>
+          </a:xfrm>
+          <a:prstGeom prst="rect">
+            <a:avLst/>
+          </a:prstGeom>
+        </p:spPr>
+        <p:txBody>
+          <a:bodyPr wrap="none">
+            <a:spAutoFit/>
+          </a:bodyPr>
+          <a:lstStyle/>
+          <a:p>
+            <a:r>
+              <a:rPr lang="it-IT" sz="2400" b="1" dirty="0"/>
+              <a:t>Generatore di numeri casuali</a:t>
+            </a:r>
+          </a:p>
+        </p:txBody>
+      </p:sp>
+    </p:spTree>
+    <p:extLst>
+      <p:ext uri="{BB962C8B-B14F-4D97-AF65-F5344CB8AC3E}">
+        <p14:creationId xmlns:p14="http://schemas.microsoft.com/office/powerpoint/2010/main" val="3422363178"/>
+      </p:ext>
+    </p:extLst>
+  </p:cSld>
+  <p:clrMapOvr>
+    <a:masterClrMapping/>
+  </p:clrMapOvr>
+</p:sld>
+</file>
+
+<file path=ppt/slides/slide4.xml><?xml version="1.0" encoding="utf-8"?>
+<p:sld xmlns:a="http://schemas.openxmlformats.org/drawingml/2006/main" xmlns:r="http://schemas.openxmlformats.org/officeDocument/2006/relationships" xmlns:p="http://schemas.openxmlformats.org/presentationml/2006/main">
+  <p:cSld>
+    <p:spTree>
+      <p:nvGrpSpPr>
+        <p:cNvPr id="1" name=""/>
+        <p:cNvGrpSpPr/>
+        <p:nvPr/>
+      </p:nvGrpSpPr>
+      <p:grpSpPr>
+        <a:xfrm>
+          <a:off x="0" y="0"/>
+          <a:ext cx="0" cy="0"/>
+          <a:chOff x="0" y="0"/>
+          <a:chExt cx="0" cy="0"/>
+        </a:xfrm>
+      </p:grpSpPr>
+      <p:sp>
+        <p:nvSpPr>
+          <p:cNvPr id="5" name="CasellaDiTesto 4"/>
+          <p:cNvSpPr txBox="1"/>
+          <p:nvPr/>
+        </p:nvSpPr>
+        <p:spPr>
+          <a:xfrm>
+            <a:off x="685800" y="1480915"/>
+            <a:ext cx="4035669" cy="4524315"/>
+          </a:xfrm>
+          <a:prstGeom prst="rect">
+            <a:avLst/>
+          </a:prstGeom>
+          <a:noFill/>
+        </p:spPr>
+        <p:txBody>
+          <a:bodyPr wrap="square" rtlCol="0">
+            <a:spAutoFit/>
+          </a:bodyPr>
+          <a:lstStyle/>
+          <a:p>
+            <a:r>
+              <a:rPr lang="it-IT" sz="2400" dirty="0" smtClean="0"/>
+              <a:t>Stato di lancio dei dadi</a:t>
+            </a:r>
+          </a:p>
+          <a:p>
+            <a:endParaRPr lang="it-IT" sz="2400" dirty="0" smtClean="0"/>
+          </a:p>
+          <a:p>
+            <a:endParaRPr lang="it-IT" sz="2400" dirty="0" smtClean="0"/>
+          </a:p>
+          <a:p>
+            <a:pPr marL="342900" indent="-342900">
+              <a:buFont typeface="Arial" panose="020B0604020202020204" pitchFamily="34" charset="0"/>
+              <a:buChar char="•"/>
+            </a:pPr>
+            <a:r>
+              <a:rPr lang="it-IT" sz="2400" dirty="0" smtClean="0"/>
+              <a:t>Movimento </a:t>
+            </a:r>
+            <a:r>
+              <a:rPr lang="it-IT" sz="2400" dirty="0" smtClean="0"/>
+              <a:t>della </a:t>
+            </a:r>
+            <a:r>
+              <a:rPr lang="it-IT" sz="2400" dirty="0" smtClean="0"/>
+              <a:t>scheda per confermare il lancio </a:t>
+            </a:r>
+            <a:endParaRPr lang="it-IT" sz="2400" dirty="0"/>
+          </a:p>
+          <a:p>
+            <a:endParaRPr lang="it-IT" sz="2400" dirty="0" smtClean="0"/>
+          </a:p>
+          <a:p>
+            <a:endParaRPr lang="it-IT" sz="2400" dirty="0" smtClean="0"/>
+          </a:p>
+          <a:p>
+            <a:pPr marL="342900" indent="-342900">
+              <a:buFont typeface="Arial" panose="020B0604020202020204" pitchFamily="34" charset="0"/>
+              <a:buChar char="•"/>
+            </a:pPr>
+            <a:r>
+              <a:rPr lang="it-IT" sz="2400" dirty="0" smtClean="0"/>
+              <a:t>Visualizzazione del risultato</a:t>
+            </a:r>
+            <a:endParaRPr lang="it-IT" sz="2400" dirty="0"/>
+          </a:p>
+          <a:p>
+            <a:endParaRPr lang="it-IT" sz="2400" dirty="0" smtClean="0"/>
+          </a:p>
+          <a:p>
+            <a:endParaRPr lang="it-IT" sz="2400" dirty="0" smtClean="0"/>
+          </a:p>
+        </p:txBody>
+      </p:sp>
+      <p:sp>
+        <p:nvSpPr>
+          <p:cNvPr id="6" name="Rettangolo 5"/>
+          <p:cNvSpPr/>
+          <p:nvPr/>
+        </p:nvSpPr>
+        <p:spPr>
+          <a:xfrm>
+            <a:off x="305332" y="606599"/>
+            <a:ext cx="4541628" cy="461665"/>
+          </a:xfrm>
+          <a:prstGeom prst="rect">
+            <a:avLst/>
+          </a:prstGeom>
+        </p:spPr>
+        <p:txBody>
+          <a:bodyPr wrap="none">
+            <a:spAutoFit/>
+          </a:bodyPr>
+          <a:lstStyle/>
+          <a:p>
+            <a:r>
+              <a:rPr lang="it-IT" sz="2400" b="1" dirty="0"/>
+              <a:t>Generatore di numeri casuali</a:t>
+            </a:r>
+          </a:p>
+        </p:txBody>
+      </p:sp>
+      <p:pic>
+        <p:nvPicPr>
+          <p:cNvPr id="3" name="Segnaposto contenuto 2"/>
+          <p:cNvPicPr>
+            <a:picLocks noGrp="1" noChangeAspect="1"/>
+          </p:cNvPicPr>
+          <p:nvPr>
+            <p:ph idx="1"/>
+          </p:nvPr>
+        </p:nvPicPr>
+        <p:blipFill>
+          <a:blip r:embed="rId2">
+            <a:extLst>
+              <a:ext uri="{28A0092B-C50C-407E-A947-70E740481C1C}">
+                <a14:useLocalDpi xmlns:a14="http://schemas.microsoft.com/office/drawing/2010/main" val="0"/>
+              </a:ext>
+            </a:extLst>
+          </a:blip>
+          <a:stretch>
+            <a:fillRect/>
+          </a:stretch>
+        </p:blipFill>
+        <p:spPr>
+          <a:xfrm>
+            <a:off x="5110480" y="837431"/>
+            <a:ext cx="6675122" cy="5187449"/>
+          </a:xfrm>
+        </p:spPr>
+      </p:pic>
+    </p:spTree>
+    <p:extLst>
+      <p:ext uri="{BB962C8B-B14F-4D97-AF65-F5344CB8AC3E}">
+        <p14:creationId xmlns:p14="http://schemas.microsoft.com/office/powerpoint/2010/main" val="4243019645"/>
+      </p:ext>
+    </p:extLst>
+  </p:cSld>
+  <p:clrMapOvr>
+    <a:masterClrMapping/>
+  </p:clrMapOvr>
+</p:sld>
+</file>
+
+<file path=ppt/slides/slide5.xml><?xml version="1.0" encoding="utf-8"?>
+<p:sld xmlns:a="http://schemas.openxmlformats.org/drawingml/2006/main" xmlns:r="http://schemas.openxmlformats.org/officeDocument/2006/relationships" xmlns:p="http://schemas.openxmlformats.org/presentationml/2006/main">
+  <p:cSld>
+    <p:spTree>
+      <p:nvGrpSpPr>
+        <p:cNvPr id="1" name=""/>
+        <p:cNvGrpSpPr/>
+        <p:nvPr/>
+      </p:nvGrpSpPr>
+      <p:grpSpPr>
+        <a:xfrm>
+          <a:off x="0" y="0"/>
+          <a:ext cx="0" cy="0"/>
+          <a:chOff x="0" y="0"/>
+          <a:chExt cx="0" cy="0"/>
+        </a:xfrm>
+      </p:grpSpPr>
+      <p:sp>
+        <p:nvSpPr>
+          <p:cNvPr id="4" name="Rettangolo 3"/>
+          <p:cNvSpPr/>
+          <p:nvPr/>
+        </p:nvSpPr>
+        <p:spPr>
+          <a:xfrm>
+            <a:off x="283339" y="454967"/>
+            <a:ext cx="4541628" cy="461665"/>
+          </a:xfrm>
+          <a:prstGeom prst="rect">
+            <a:avLst/>
+          </a:prstGeom>
+        </p:spPr>
+        <p:txBody>
+          <a:bodyPr wrap="none">
+            <a:spAutoFit/>
+          </a:bodyPr>
+          <a:lstStyle/>
+          <a:p>
+            <a:r>
+              <a:rPr lang="it-IT" sz="2400" b="1" dirty="0"/>
+              <a:t>Generatore di numeri casuali</a:t>
+            </a:r>
+            <a:endParaRPr lang="it-IT" sz="2400" b="1" dirty="0"/>
+          </a:p>
+        </p:txBody>
+      </p:sp>
+      <p:pic>
+        <p:nvPicPr>
+          <p:cNvPr id="5" name="Immagine 4"/>
+          <p:cNvPicPr>
+            <a:picLocks noChangeAspect="1"/>
+          </p:cNvPicPr>
+          <p:nvPr/>
+        </p:nvPicPr>
+        <p:blipFill>
+          <a:blip r:embed="rId2">
+            <a:extLst>
+              <a:ext uri="{28A0092B-C50C-407E-A947-70E740481C1C}">
+                <a14:useLocalDpi xmlns:a14="http://schemas.microsoft.com/office/drawing/2010/main" val="0"/>
+              </a:ext>
+            </a:extLst>
+          </a:blip>
+          <a:stretch>
+            <a:fillRect/>
+          </a:stretch>
+        </p:blipFill>
+        <p:spPr>
+          <a:xfrm>
+            <a:off x="5008182" y="685800"/>
+            <a:ext cx="6896343" cy="5435370"/>
+          </a:xfrm>
+          <a:prstGeom prst="rect">
+            <a:avLst/>
+          </a:prstGeom>
+        </p:spPr>
+      </p:pic>
+      <p:sp>
+        <p:nvSpPr>
+          <p:cNvPr id="6" name="Ovale 5"/>
+          <p:cNvSpPr/>
+          <p:nvPr/>
+        </p:nvSpPr>
+        <p:spPr>
+          <a:xfrm>
+            <a:off x="9979269" y="3763108"/>
+            <a:ext cx="1028701" cy="404446"/>
+          </a:xfrm>
+          <a:prstGeom prst="ellipse">
+            <a:avLst/>
+          </a:prstGeom>
+          <a:noFill/>
+          <a:ln>
+            <a:solidFill>
+              <a:srgbClr val="FF0000"/>
+            </a:solidFill>
+          </a:ln>
+        </p:spPr>
+        <p:style>
+          <a:lnRef idx="2">
+            <a:schemeClr val="accent1">
+              <a:shade val="50000"/>
+            </a:schemeClr>
+          </a:lnRef>
+          <a:fillRef idx="1">
+            <a:schemeClr val="accent1"/>
+          </a:fillRef>
+          <a:effectRef idx="0">
+            <a:schemeClr val="accent1"/>
+          </a:effectRef>
+          <a:fontRef idx="minor">
+            <a:schemeClr val="lt1"/>
+          </a:fontRef>
+        </p:style>
+        <p:txBody>
+          <a:bodyPr rtlCol="0" anchor="ctr"/>
+          <a:lstStyle/>
+          <a:p>
+            <a:pPr algn="ctr"/>
+            <a:endParaRPr lang="it-IT"/>
+          </a:p>
+        </p:txBody>
+      </p:sp>
+      <p:sp>
+        <p:nvSpPr>
+          <p:cNvPr id="7" name="Ovale 6"/>
+          <p:cNvSpPr/>
+          <p:nvPr/>
+        </p:nvSpPr>
+        <p:spPr>
+          <a:xfrm>
+            <a:off x="7447085" y="5020408"/>
+            <a:ext cx="1899138" cy="747346"/>
+          </a:xfrm>
+          <a:prstGeom prst="ellipse">
+            <a:avLst/>
+          </a:prstGeom>
+          <a:noFill/>
+          <a:ln>
+            <a:solidFill>
+              <a:srgbClr val="FF0000"/>
+            </a:solidFill>
+          </a:ln>
+        </p:spPr>
+        <p:style>
+          <a:lnRef idx="2">
+            <a:schemeClr val="accent1">
+              <a:shade val="50000"/>
+            </a:schemeClr>
+          </a:lnRef>
+          <a:fillRef idx="1">
+            <a:schemeClr val="accent1"/>
+          </a:fillRef>
+          <a:effectRef idx="0">
+            <a:schemeClr val="accent1"/>
+          </a:effectRef>
+          <a:fontRef idx="minor">
+            <a:schemeClr val="lt1"/>
+          </a:fontRef>
+        </p:style>
+        <p:txBody>
+          <a:bodyPr rtlCol="0" anchor="ctr"/>
+          <a:lstStyle/>
+          <a:p>
+            <a:pPr algn="ctr"/>
+            <a:endParaRPr lang="it-IT"/>
+          </a:p>
+        </p:txBody>
+      </p:sp>
+      <p:cxnSp>
+        <p:nvCxnSpPr>
+          <p:cNvPr id="9" name="Connettore 2 8"/>
+          <p:cNvCxnSpPr/>
+          <p:nvPr/>
+        </p:nvCxnSpPr>
+        <p:spPr>
+          <a:xfrm>
+            <a:off x="6814038" y="4747846"/>
+            <a:ext cx="633047" cy="501162"/>
+          </a:xfrm>
+          <a:prstGeom prst="straightConnector1">
+            <a:avLst/>
+          </a:prstGeom>
+          <a:ln>
+            <a:solidFill>
+              <a:srgbClr val="FF0000">
+                <a:alpha val="60000"/>
+              </a:srgbClr>
+            </a:solidFill>
+            <a:tailEnd type="triangle"/>
+          </a:ln>
+        </p:spPr>
+        <p:style>
+          <a:lnRef idx="1">
+            <a:schemeClr val="accent1"/>
+          </a:lnRef>
+          <a:fillRef idx="0">
+            <a:schemeClr val="accent1"/>
+          </a:fillRef>
+          <a:effectRef idx="0">
+            <a:schemeClr val="accent1"/>
+          </a:effectRef>
+          <a:fontRef idx="minor">
+            <a:schemeClr val="tx1"/>
+          </a:fontRef>
+        </p:style>
+      </p:cxnSp>
+      <p:cxnSp>
+        <p:nvCxnSpPr>
+          <p:cNvPr id="11" name="Connettore 2 10"/>
+          <p:cNvCxnSpPr/>
+          <p:nvPr/>
+        </p:nvCxnSpPr>
+        <p:spPr>
+          <a:xfrm>
+            <a:off x="9829800" y="3403485"/>
+            <a:ext cx="298938" cy="359623"/>
+          </a:xfrm>
+          <a:prstGeom prst="straightConnector1">
+            <a:avLst/>
+          </a:prstGeom>
+          <a:ln>
+            <a:solidFill>
+              <a:srgbClr val="FF0000">
+                <a:alpha val="60000"/>
+              </a:srgbClr>
+            </a:solidFill>
+            <a:tailEnd type="triangle"/>
+          </a:ln>
+        </p:spPr>
+        <p:style>
+          <a:lnRef idx="1">
+            <a:schemeClr val="accent1"/>
+          </a:lnRef>
+          <a:fillRef idx="0">
+            <a:schemeClr val="accent1"/>
+          </a:fillRef>
+          <a:effectRef idx="0">
+            <a:schemeClr val="accent1"/>
+          </a:effectRef>
+          <a:fontRef idx="minor">
+            <a:schemeClr val="tx1"/>
+          </a:fontRef>
+        </p:style>
+      </p:cxnSp>
+      <p:sp>
+        <p:nvSpPr>
+          <p:cNvPr id="13" name="Rettangolo 12"/>
+          <p:cNvSpPr/>
+          <p:nvPr/>
+        </p:nvSpPr>
+        <p:spPr>
+          <a:xfrm>
+            <a:off x="371903" y="1832688"/>
+            <a:ext cx="3969389" cy="3416320"/>
+          </a:xfrm>
+          <a:prstGeom prst="rect">
+            <a:avLst/>
+          </a:prstGeom>
+        </p:spPr>
+        <p:txBody>
+          <a:bodyPr wrap="square">
+            <a:spAutoFit/>
+          </a:bodyPr>
+          <a:lstStyle/>
+          <a:p>
+            <a:pPr marL="285750" indent="-285750">
+              <a:buFont typeface="Arial" panose="020B0604020202020204" pitchFamily="34" charset="0"/>
+              <a:buChar char="•"/>
+            </a:pPr>
+            <a:r>
+              <a:rPr lang="it-IT" sz="2400" dirty="0" smtClean="0"/>
+              <a:t>Bottone per cambiare lo stato del sistema (comunicazione uplink) </a:t>
+            </a:r>
+          </a:p>
+          <a:p>
+            <a:endParaRPr lang="it-IT" sz="2400" dirty="0" smtClean="0"/>
+          </a:p>
+          <a:p>
+            <a:endParaRPr lang="it-IT" sz="2400" dirty="0" smtClean="0"/>
+          </a:p>
+          <a:p>
+            <a:pPr marL="285750" indent="-285750">
+              <a:buFont typeface="Arial" panose="020B0604020202020204" pitchFamily="34" charset="0"/>
+              <a:buChar char="•"/>
+            </a:pPr>
+            <a:endParaRPr lang="it-IT" sz="2400" dirty="0"/>
+          </a:p>
+          <a:p>
+            <a:pPr marL="285750" indent="-285750">
+              <a:buFont typeface="Arial" panose="020B0604020202020204" pitchFamily="34" charset="0"/>
+              <a:buChar char="•"/>
+            </a:pPr>
+            <a:r>
+              <a:rPr lang="it-IT" sz="2400" dirty="0" smtClean="0"/>
+              <a:t>Bottone per resettare il sistema e ripristinare le condizioni iniziali</a:t>
+            </a:r>
+            <a:endParaRPr lang="it-IT" sz="2400" dirty="0"/>
+          </a:p>
+        </p:txBody>
+      </p:sp>
+    </p:spTree>
+    <p:extLst>
+      <p:ext uri="{BB962C8B-B14F-4D97-AF65-F5344CB8AC3E}">
+        <p14:creationId xmlns:p14="http://schemas.microsoft.com/office/powerpoint/2010/main" val="635380967"/>
+      </p:ext>
+    </p:extLst>
+  </p:cSld>
+  <p:clrMapOvr>
+    <a:masterClrMapping/>
+  </p:clrMapOvr>
+</p:sld>
+</file>
+
+<file path=ppt/slides/slide6.xml><?xml version="1.0" encoding="utf-8"?>
+<p:sld xmlns:a="http://schemas.openxmlformats.org/drawingml/2006/main" xmlns:r="http://schemas.openxmlformats.org/officeDocument/2006/relationships" xmlns:p="http://schemas.openxmlformats.org/presentationml/2006/main">
+  <p:cSld>
+    <p:spTree>
+      <p:nvGrpSpPr>
+        <p:cNvPr id="1" name=""/>
+        <p:cNvGrpSpPr/>
+        <p:nvPr/>
+      </p:nvGrpSpPr>
+      <p:grpSpPr>
+        <a:xfrm>
+          <a:off x="0" y="0"/>
+          <a:ext cx="0" cy="0"/>
+          <a:chOff x="0" y="0"/>
+          <a:chExt cx="0" cy="0"/>
+        </a:xfrm>
+      </p:grpSpPr>
+      <p:sp>
+        <p:nvSpPr>
+          <p:cNvPr id="2" name="Titolo 1"/>
+          <p:cNvSpPr>
+            <a:spLocks noGrp="1"/>
+          </p:cNvSpPr>
+          <p:nvPr>
+            <p:ph type="title"/>
+          </p:nvPr>
+        </p:nvSpPr>
+        <p:spPr/>
+        <p:txBody>
+          <a:bodyPr/>
+          <a:lstStyle/>
+          <a:p>
+            <a:endParaRPr lang="it-IT"/>
+          </a:p>
+        </p:txBody>
+      </p:sp>
+      <p:sp>
+        <p:nvSpPr>
+          <p:cNvPr id="3" name="Segnaposto contenuto 2"/>
+          <p:cNvSpPr>
+            <a:spLocks noGrp="1"/>
+          </p:cNvSpPr>
+          <p:nvPr>
+            <p:ph idx="1"/>
+          </p:nvPr>
+        </p:nvSpPr>
+        <p:spPr/>
+        <p:txBody>
+          <a:bodyPr/>
+          <a:lstStyle/>
+          <a:p>
+            <a:r>
+              <a:rPr lang="it-IT" dirty="0" smtClean="0"/>
+              <a:t>Slide per la macchina a stati</a:t>
+            </a:r>
+            <a:endParaRPr lang="it-IT" dirty="0"/>
+          </a:p>
+        </p:txBody>
+      </p:sp>
+    </p:spTree>
+    <p:extLst>
+      <p:ext uri="{BB962C8B-B14F-4D97-AF65-F5344CB8AC3E}">
+        <p14:creationId xmlns:p14="http://schemas.microsoft.com/office/powerpoint/2010/main" val="2045395592"/>
+      </p:ext>
+    </p:extLst>
+  </p:cSld>
+  <p:clrMapOvr>
+    <a:masterClrMapping/>
+  </p:clrMapOvr>
+</p:sld>
+</file>
+
+<file path=ppt/slides/slide7.xml><?xml version="1.0" encoding="utf-8"?>
+<p:sld xmlns:a="http://schemas.openxmlformats.org/drawingml/2006/main" xmlns:r="http://schemas.openxmlformats.org/officeDocument/2006/relationships" xmlns:p="http://schemas.openxmlformats.org/presentationml/2006/main">
+  <p:cSld>
+    <p:spTree>
+      <p:nvGrpSpPr>
+        <p:cNvPr id="1" name=""/>
+        <p:cNvGrpSpPr/>
+        <p:nvPr/>
+      </p:nvGrpSpPr>
+      <p:grpSpPr>
+        <a:xfrm>
+          <a:off x="0" y="0"/>
+          <a:ext cx="0" cy="0"/>
+          <a:chOff x="0" y="0"/>
+          <a:chExt cx="0" cy="0"/>
+        </a:xfrm>
+      </p:grpSpPr>
+      <p:sp>
+        <p:nvSpPr>
+          <p:cNvPr id="2" name="Titolo 1"/>
+          <p:cNvSpPr>
+            <a:spLocks noGrp="1"/>
+          </p:cNvSpPr>
+          <p:nvPr>
+            <p:ph type="title"/>
+          </p:nvPr>
+        </p:nvSpPr>
+        <p:spPr/>
+        <p:txBody>
+          <a:bodyPr/>
+          <a:lstStyle/>
+          <a:p>
+            <a:endParaRPr lang="it-IT"/>
+          </a:p>
+        </p:txBody>
+      </p:sp>
+      <p:sp>
+        <p:nvSpPr>
+          <p:cNvPr id="3" name="Segnaposto contenuto 2"/>
+          <p:cNvSpPr>
+            <a:spLocks noGrp="1"/>
+          </p:cNvSpPr>
+          <p:nvPr>
+            <p:ph idx="1"/>
+          </p:nvPr>
+        </p:nvSpPr>
+        <p:spPr/>
+        <p:txBody>
+          <a:bodyPr/>
+          <a:lstStyle/>
+          <a:p>
+            <a:r>
+              <a:rPr lang="it-IT" dirty="0" smtClean="0"/>
+              <a:t>Slide per modifiche del buffer (?)</a:t>
+            </a:r>
+            <a:endParaRPr lang="it-IT" dirty="0"/>
+          </a:p>
+        </p:txBody>
+      </p:sp>
+    </p:spTree>
+    <p:extLst>
+      <p:ext uri="{BB962C8B-B14F-4D97-AF65-F5344CB8AC3E}">
+        <p14:creationId xmlns:p14="http://schemas.microsoft.com/office/powerpoint/2010/main" val="1640581264"/>
+      </p:ext>
+    </p:extLst>
+  </p:cSld>
+  <p:clrMapOvr>
+    <a:masterClrMapping/>
+  </p:clrMapOvr>
+</p:sld>
+</file>
+
+<file path=ppt/slides/slide8.xml><?xml version="1.0" encoding="utf-8"?>
+<p:sld xmlns:a="http://schemas.openxmlformats.org/drawingml/2006/main" xmlns:r="http://schemas.openxmlformats.org/officeDocument/2006/relationships" xmlns:p="http://schemas.openxmlformats.org/presentationml/2006/main">
+  <p:cSld>
+    <p:spTree>
+      <p:nvGrpSpPr>
+        <p:cNvPr id="1" name=""/>
+        <p:cNvGrpSpPr/>
+        <p:nvPr/>
+      </p:nvGrpSpPr>
+      <p:grpSpPr>
+        <a:xfrm>
+          <a:off x="0" y="0"/>
+          <a:ext cx="0" cy="0"/>
+          <a:chOff x="0" y="0"/>
+          <a:chExt cx="0" cy="0"/>
+        </a:xfrm>
+      </p:grpSpPr>
+      <p:sp>
+        <p:nvSpPr>
+          <p:cNvPr id="2" name="Titolo 1"/>
+          <p:cNvSpPr>
+            <a:spLocks noGrp="1"/>
+          </p:cNvSpPr>
+          <p:nvPr>
+            <p:ph type="title"/>
+          </p:nvPr>
+        </p:nvSpPr>
+        <p:spPr/>
+        <p:txBody>
+          <a:bodyPr/>
+          <a:lstStyle/>
+          <a:p>
+            <a:endParaRPr lang="it-IT"/>
+          </a:p>
+        </p:txBody>
+      </p:sp>
+      <p:sp>
+        <p:nvSpPr>
+          <p:cNvPr id="3" name="Segnaposto contenuto 2"/>
+          <p:cNvSpPr>
+            <a:spLocks noGrp="1"/>
+          </p:cNvSpPr>
+          <p:nvPr>
+            <p:ph idx="1"/>
+          </p:nvPr>
+        </p:nvSpPr>
+        <p:spPr/>
+        <p:txBody>
+          <a:bodyPr/>
+          <a:lstStyle/>
+          <a:p>
+            <a:r>
+              <a:rPr lang="it-IT" dirty="0" smtClean="0"/>
+              <a:t>Ringraziamenti e crediti</a:t>
+            </a:r>
+            <a:endParaRPr lang="it-IT" dirty="0"/>
+          </a:p>
+        </p:txBody>
+      </p:sp>
+    </p:spTree>
+    <p:extLst>
+      <p:ext uri="{BB962C8B-B14F-4D97-AF65-F5344CB8AC3E}">
+        <p14:creationId xmlns:p14="http://schemas.microsoft.com/office/powerpoint/2010/main" val="457155859"/>
+      </p:ext>
+    </p:extLst>
+  </p:cSld>
+  <p:clrMapOvr>
+    <a:masterClrMapping/>
+  </p:clrMapOvr>
+</p:sld>
+</file>
+
 <file path=ppt/theme/theme1.xml><?xml version="1.0" encoding="utf-8"?>
 <a:theme xmlns:a="http://schemas.openxmlformats.org/drawingml/2006/main" name="Sezione">
   <a:themeElements>

</xml_diff>

<commit_message>
immagini aggiunte e modifica ppt
</commit_message>
<xml_diff>
--- a/PresentazioneOfficial.pptx
+++ b/PresentazioneOfficial.pptx
@@ -10,9 +10,14 @@
     <p:sldId id="258" r:id="rId4"/>
     <p:sldId id="260" r:id="rId5"/>
     <p:sldId id="261" r:id="rId6"/>
-    <p:sldId id="262" r:id="rId7"/>
-    <p:sldId id="263" r:id="rId8"/>
-    <p:sldId id="264" r:id="rId9"/>
+    <p:sldId id="267" r:id="rId7"/>
+    <p:sldId id="265" r:id="rId8"/>
+    <p:sldId id="266" r:id="rId9"/>
+    <p:sldId id="268" r:id="rId10"/>
+    <p:sldId id="269" r:id="rId11"/>
+    <p:sldId id="262" r:id="rId12"/>
+    <p:sldId id="263" r:id="rId13"/>
+    <p:sldId id="264" r:id="rId14"/>
   </p:sldIdLst>
   <p:sldSz cx="12192000" cy="6858000"/>
   <p:notesSz cx="6858000" cy="9144000"/>
@@ -5403,6 +5408,439 @@
 </p:sld>
 </file>
 
+<file path=ppt/slides/slide10.xml><?xml version="1.0" encoding="utf-8"?>
+<p:sld xmlns:a="http://schemas.openxmlformats.org/drawingml/2006/main" xmlns:r="http://schemas.openxmlformats.org/officeDocument/2006/relationships" xmlns:p="http://schemas.openxmlformats.org/presentationml/2006/main">
+  <p:cSld>
+    <p:spTree>
+      <p:nvGrpSpPr>
+        <p:cNvPr id="1" name=""/>
+        <p:cNvGrpSpPr/>
+        <p:nvPr/>
+      </p:nvGrpSpPr>
+      <p:grpSpPr>
+        <a:xfrm>
+          <a:off x="0" y="0"/>
+          <a:ext cx="0" cy="0"/>
+          <a:chOff x="0" y="0"/>
+          <a:chExt cx="0" cy="0"/>
+        </a:xfrm>
+      </p:grpSpPr>
+      <p:sp>
+        <p:nvSpPr>
+          <p:cNvPr id="4" name="CasellaDiTesto 3"/>
+          <p:cNvSpPr txBox="1"/>
+          <p:nvPr/>
+        </p:nvSpPr>
+        <p:spPr>
+          <a:xfrm>
+            <a:off x="905608" y="589085"/>
+            <a:ext cx="7165731" cy="369332"/>
+          </a:xfrm>
+          <a:prstGeom prst="rect">
+            <a:avLst/>
+          </a:prstGeom>
+          <a:noFill/>
+        </p:spPr>
+        <p:txBody>
+          <a:bodyPr wrap="square" rtlCol="0">
+            <a:spAutoFit/>
+          </a:bodyPr>
+          <a:lstStyle/>
+          <a:p>
+            <a:endParaRPr lang="it-IT" dirty="0"/>
+          </a:p>
+        </p:txBody>
+      </p:sp>
+      <p:sp>
+        <p:nvSpPr>
+          <p:cNvPr id="5" name="CasellaDiTesto 4"/>
+          <p:cNvSpPr txBox="1"/>
+          <p:nvPr/>
+        </p:nvSpPr>
+        <p:spPr>
+          <a:xfrm>
+            <a:off x="905608" y="958417"/>
+            <a:ext cx="7165731" cy="461665"/>
+          </a:xfrm>
+          <a:prstGeom prst="rect">
+            <a:avLst/>
+          </a:prstGeom>
+          <a:noFill/>
+        </p:spPr>
+        <p:txBody>
+          <a:bodyPr wrap="square" rtlCol="0">
+            <a:spAutoFit/>
+          </a:bodyPr>
+          <a:lstStyle/>
+          <a:p>
+            <a:r>
+              <a:rPr lang="it-IT" sz="2400" b="1" dirty="0" smtClean="0"/>
+              <a:t>Modifiche al codice del microcontrollore </a:t>
+            </a:r>
+            <a:endParaRPr lang="it-IT" sz="2400" b="1" dirty="0"/>
+          </a:p>
+        </p:txBody>
+      </p:sp>
+      <p:sp>
+        <p:nvSpPr>
+          <p:cNvPr id="7" name="CasellaDiTesto 6"/>
+          <p:cNvSpPr txBox="1"/>
+          <p:nvPr/>
+        </p:nvSpPr>
+        <p:spPr>
+          <a:xfrm>
+            <a:off x="492371" y="2421883"/>
+            <a:ext cx="4703883" cy="3785652"/>
+          </a:xfrm>
+          <a:prstGeom prst="rect">
+            <a:avLst/>
+          </a:prstGeom>
+          <a:noFill/>
+        </p:spPr>
+        <p:txBody>
+          <a:bodyPr wrap="square" rtlCol="0">
+            <a:spAutoFit/>
+          </a:bodyPr>
+          <a:lstStyle/>
+          <a:p>
+            <a:pPr marL="285750" indent="-285750">
+              <a:buFont typeface="Arial" panose="020B0604020202020204" pitchFamily="34" charset="0"/>
+              <a:buChar char="•"/>
+            </a:pPr>
+            <a:r>
+              <a:rPr lang="it-IT" sz="2400" dirty="0" smtClean="0"/>
+              <a:t>Modifica della funzione </a:t>
+            </a:r>
+            <a:r>
+              <a:rPr lang="it-IT" sz="2400" dirty="0" err="1" smtClean="0"/>
+              <a:t>OnTxData</a:t>
+            </a:r>
+            <a:r>
+              <a:rPr lang="it-IT" sz="2400" dirty="0" smtClean="0"/>
+              <a:t>() per comunicazione </a:t>
+            </a:r>
+            <a:r>
+              <a:rPr lang="it-IT" sz="2400" b="1" dirty="0" err="1" smtClean="0"/>
+              <a:t>donwlink</a:t>
+            </a:r>
+            <a:endParaRPr lang="it-IT" sz="2400" b="1" dirty="0" smtClean="0"/>
+          </a:p>
+          <a:p>
+            <a:pPr marL="285750" indent="-285750">
+              <a:buFont typeface="Arial" panose="020B0604020202020204" pitchFamily="34" charset="0"/>
+              <a:buChar char="•"/>
+            </a:pPr>
+            <a:endParaRPr lang="it-IT" sz="2400" b="1" dirty="0"/>
+          </a:p>
+          <a:p>
+            <a:endParaRPr lang="it-IT" sz="2400" b="1" dirty="0" smtClean="0"/>
+          </a:p>
+          <a:p>
+            <a:pPr marL="285750" indent="-285750">
+              <a:buFont typeface="Arial" panose="020B0604020202020204" pitchFamily="34" charset="0"/>
+              <a:buChar char="•"/>
+            </a:pPr>
+            <a:r>
+              <a:rPr lang="it-IT" sz="2400" dirty="0" smtClean="0"/>
+              <a:t>Lettura del buffer</a:t>
+            </a:r>
+          </a:p>
+          <a:p>
+            <a:pPr marL="285750" indent="-285750">
+              <a:buFont typeface="Arial" panose="020B0604020202020204" pitchFamily="34" charset="0"/>
+              <a:buChar char="•"/>
+            </a:pPr>
+            <a:endParaRPr lang="it-IT" sz="2400" dirty="0"/>
+          </a:p>
+          <a:p>
+            <a:endParaRPr lang="it-IT" sz="2400" dirty="0" smtClean="0"/>
+          </a:p>
+          <a:p>
+            <a:endParaRPr lang="it-IT" sz="2400" dirty="0" smtClean="0"/>
+          </a:p>
+          <a:p>
+            <a:endParaRPr lang="it-IT" sz="2400" dirty="0" smtClean="0"/>
+          </a:p>
+        </p:txBody>
+      </p:sp>
+      <p:pic>
+        <p:nvPicPr>
+          <p:cNvPr id="2" name="Immagine 1"/>
+          <p:cNvPicPr>
+            <a:picLocks noChangeAspect="1"/>
+          </p:cNvPicPr>
+          <p:nvPr/>
+        </p:nvPicPr>
+        <p:blipFill>
+          <a:blip r:embed="rId2">
+            <a:extLst>
+              <a:ext uri="{28A0092B-C50C-407E-A947-70E740481C1C}">
+                <a14:useLocalDpi xmlns:a14="http://schemas.microsoft.com/office/drawing/2010/main" val="0"/>
+              </a:ext>
+            </a:extLst>
+          </a:blip>
+          <a:stretch>
+            <a:fillRect/>
+          </a:stretch>
+        </p:blipFill>
+        <p:spPr>
+          <a:xfrm>
+            <a:off x="5066117" y="2421883"/>
+            <a:ext cx="6854603" cy="2563355"/>
+          </a:xfrm>
+          <a:prstGeom prst="rect">
+            <a:avLst/>
+          </a:prstGeom>
+        </p:spPr>
+      </p:pic>
+    </p:spTree>
+    <p:extLst>
+      <p:ext uri="{BB962C8B-B14F-4D97-AF65-F5344CB8AC3E}">
+        <p14:creationId xmlns:p14="http://schemas.microsoft.com/office/powerpoint/2010/main" val="3900188506"/>
+      </p:ext>
+    </p:extLst>
+  </p:cSld>
+  <p:clrMapOvr>
+    <a:masterClrMapping/>
+  </p:clrMapOvr>
+  <p:timing>
+    <p:tnLst>
+      <p:par>
+        <p:cTn id="1" dur="indefinite" restart="never" nodeType="tmRoot"/>
+      </p:par>
+    </p:tnLst>
+  </p:timing>
+</p:sld>
+</file>
+
+<file path=ppt/slides/slide11.xml><?xml version="1.0" encoding="utf-8"?>
+<p:sld xmlns:a="http://schemas.openxmlformats.org/drawingml/2006/main" xmlns:r="http://schemas.openxmlformats.org/officeDocument/2006/relationships" xmlns:p="http://schemas.openxmlformats.org/presentationml/2006/main">
+  <p:cSld>
+    <p:spTree>
+      <p:nvGrpSpPr>
+        <p:cNvPr id="1" name=""/>
+        <p:cNvGrpSpPr/>
+        <p:nvPr/>
+      </p:nvGrpSpPr>
+      <p:grpSpPr>
+        <a:xfrm>
+          <a:off x="0" y="0"/>
+          <a:ext cx="0" cy="0"/>
+          <a:chOff x="0" y="0"/>
+          <a:chExt cx="0" cy="0"/>
+        </a:xfrm>
+      </p:grpSpPr>
+      <p:sp>
+        <p:nvSpPr>
+          <p:cNvPr id="3" name="Segnaposto contenuto 2"/>
+          <p:cNvSpPr>
+            <a:spLocks noGrp="1"/>
+          </p:cNvSpPr>
+          <p:nvPr>
+            <p:ph idx="1"/>
+          </p:nvPr>
+        </p:nvSpPr>
+        <p:spPr>
+          <a:xfrm>
+            <a:off x="701796" y="2108199"/>
+            <a:ext cx="8534400" cy="3615267"/>
+          </a:xfrm>
+        </p:spPr>
+        <p:txBody>
+          <a:bodyPr/>
+          <a:lstStyle/>
+          <a:p>
+            <a:r>
+              <a:rPr lang="it-IT" dirty="0" smtClean="0"/>
+              <a:t>Slide per la macchina a stati</a:t>
+            </a:r>
+            <a:endParaRPr lang="it-IT" dirty="0"/>
+          </a:p>
+        </p:txBody>
+      </p:sp>
+    </p:spTree>
+    <p:extLst>
+      <p:ext uri="{BB962C8B-B14F-4D97-AF65-F5344CB8AC3E}">
+        <p14:creationId xmlns:p14="http://schemas.microsoft.com/office/powerpoint/2010/main" val="2045395592"/>
+      </p:ext>
+    </p:extLst>
+  </p:cSld>
+  <p:clrMapOvr>
+    <a:masterClrMapping/>
+  </p:clrMapOvr>
+  <p:timing>
+    <p:tnLst>
+      <p:par>
+        <p:cTn id="1" dur="indefinite" restart="never" nodeType="tmRoot"/>
+      </p:par>
+    </p:tnLst>
+  </p:timing>
+</p:sld>
+</file>
+
+<file path=ppt/slides/slide12.xml><?xml version="1.0" encoding="utf-8"?>
+<p:sld xmlns:a="http://schemas.openxmlformats.org/drawingml/2006/main" xmlns:r="http://schemas.openxmlformats.org/officeDocument/2006/relationships" xmlns:p="http://schemas.openxmlformats.org/presentationml/2006/main">
+  <p:cSld>
+    <p:spTree>
+      <p:nvGrpSpPr>
+        <p:cNvPr id="1" name=""/>
+        <p:cNvGrpSpPr/>
+        <p:nvPr/>
+      </p:nvGrpSpPr>
+      <p:grpSpPr>
+        <a:xfrm>
+          <a:off x="0" y="0"/>
+          <a:ext cx="0" cy="0"/>
+          <a:chOff x="0" y="0"/>
+          <a:chExt cx="0" cy="0"/>
+        </a:xfrm>
+      </p:grpSpPr>
+      <p:sp>
+        <p:nvSpPr>
+          <p:cNvPr id="3" name="Segnaposto contenuto 2"/>
+          <p:cNvSpPr>
+            <a:spLocks noGrp="1"/>
+          </p:cNvSpPr>
+          <p:nvPr>
+            <p:ph idx="1"/>
+          </p:nvPr>
+        </p:nvSpPr>
+        <p:spPr>
+          <a:xfrm>
+            <a:off x="710589" y="2453054"/>
+            <a:ext cx="8534400" cy="3615267"/>
+          </a:xfrm>
+        </p:spPr>
+        <p:txBody>
+          <a:bodyPr/>
+          <a:lstStyle/>
+          <a:p>
+            <a:r>
+              <a:rPr lang="it-IT" dirty="0" smtClean="0"/>
+              <a:t>Slide per modifiche del buffer (?)</a:t>
+            </a:r>
+            <a:endParaRPr lang="it-IT" dirty="0"/>
+          </a:p>
+        </p:txBody>
+      </p:sp>
+      <p:sp>
+        <p:nvSpPr>
+          <p:cNvPr id="4" name="CasellaDiTesto 3"/>
+          <p:cNvSpPr txBox="1"/>
+          <p:nvPr/>
+        </p:nvSpPr>
+        <p:spPr>
+          <a:xfrm>
+            <a:off x="710589" y="852854"/>
+            <a:ext cx="7165731" cy="369332"/>
+          </a:xfrm>
+          <a:prstGeom prst="rect">
+            <a:avLst/>
+          </a:prstGeom>
+          <a:noFill/>
+        </p:spPr>
+        <p:txBody>
+          <a:bodyPr wrap="square" rtlCol="0">
+            <a:spAutoFit/>
+          </a:bodyPr>
+          <a:lstStyle/>
+          <a:p>
+            <a:endParaRPr lang="it-IT" dirty="0"/>
+          </a:p>
+        </p:txBody>
+      </p:sp>
+    </p:spTree>
+    <p:extLst>
+      <p:ext uri="{BB962C8B-B14F-4D97-AF65-F5344CB8AC3E}">
+        <p14:creationId xmlns:p14="http://schemas.microsoft.com/office/powerpoint/2010/main" val="1640581264"/>
+      </p:ext>
+    </p:extLst>
+  </p:cSld>
+  <p:clrMapOvr>
+    <a:masterClrMapping/>
+  </p:clrMapOvr>
+  <p:timing>
+    <p:tnLst>
+      <p:par>
+        <p:cTn id="1" dur="indefinite" restart="never" nodeType="tmRoot"/>
+      </p:par>
+    </p:tnLst>
+  </p:timing>
+</p:sld>
+</file>
+
+<file path=ppt/slides/slide13.xml><?xml version="1.0" encoding="utf-8"?>
+<p:sld xmlns:a="http://schemas.openxmlformats.org/drawingml/2006/main" xmlns:r="http://schemas.openxmlformats.org/officeDocument/2006/relationships" xmlns:p="http://schemas.openxmlformats.org/presentationml/2006/main">
+  <p:cSld>
+    <p:spTree>
+      <p:nvGrpSpPr>
+        <p:cNvPr id="1" name=""/>
+        <p:cNvGrpSpPr/>
+        <p:nvPr/>
+      </p:nvGrpSpPr>
+      <p:grpSpPr>
+        <a:xfrm>
+          <a:off x="0" y="0"/>
+          <a:ext cx="0" cy="0"/>
+          <a:chOff x="0" y="0"/>
+          <a:chExt cx="0" cy="0"/>
+        </a:xfrm>
+      </p:grpSpPr>
+      <p:sp>
+        <p:nvSpPr>
+          <p:cNvPr id="2" name="Titolo 1"/>
+          <p:cNvSpPr>
+            <a:spLocks noGrp="1"/>
+          </p:cNvSpPr>
+          <p:nvPr>
+            <p:ph type="title"/>
+          </p:nvPr>
+        </p:nvSpPr>
+        <p:spPr/>
+        <p:txBody>
+          <a:bodyPr/>
+          <a:lstStyle/>
+          <a:p>
+            <a:endParaRPr lang="it-IT"/>
+          </a:p>
+        </p:txBody>
+      </p:sp>
+      <p:sp>
+        <p:nvSpPr>
+          <p:cNvPr id="3" name="Segnaposto contenuto 2"/>
+          <p:cNvSpPr>
+            <a:spLocks noGrp="1"/>
+          </p:cNvSpPr>
+          <p:nvPr>
+            <p:ph idx="1"/>
+          </p:nvPr>
+        </p:nvSpPr>
+        <p:spPr/>
+        <p:txBody>
+          <a:bodyPr/>
+          <a:lstStyle/>
+          <a:p>
+            <a:r>
+              <a:rPr lang="it-IT" dirty="0" smtClean="0"/>
+              <a:t>Ringraziamenti e crediti</a:t>
+            </a:r>
+            <a:endParaRPr lang="it-IT" dirty="0"/>
+          </a:p>
+        </p:txBody>
+      </p:sp>
+    </p:spTree>
+    <p:extLst>
+      <p:ext uri="{BB962C8B-B14F-4D97-AF65-F5344CB8AC3E}">
+        <p14:creationId xmlns:p14="http://schemas.microsoft.com/office/powerpoint/2010/main" val="457155859"/>
+      </p:ext>
+    </p:extLst>
+  </p:cSld>
+  <p:clrMapOvr>
+    <a:masterClrMapping/>
+  </p:clrMapOvr>
+</p:sld>
+</file>
+
 <file path=ppt/slides/slide2.xml><?xml version="1.0" encoding="utf-8"?>
 <p:sld xmlns:a="http://schemas.openxmlformats.org/drawingml/2006/main" xmlns:r="http://schemas.openxmlformats.org/officeDocument/2006/relationships" xmlns:p="http://schemas.openxmlformats.org/presentationml/2006/main">
   <p:cSld>
@@ -6154,7 +6592,6 @@
               <a:rPr lang="it-IT" sz="2400" dirty="0" smtClean="0"/>
               <a:t>) </a:t>
             </a:r>
-            <a:endParaRPr lang="it-IT" sz="2400" dirty="0" smtClean="0"/>
           </a:p>
           <a:p>
             <a:endParaRPr lang="it-IT" sz="2400" dirty="0" smtClean="0"/>
@@ -6192,6 +6629,13 @@
   <p:clrMapOvr>
     <a:masterClrMapping/>
   </p:clrMapOvr>
+  <p:timing>
+    <p:tnLst>
+      <p:par>
+        <p:cTn id="1" dur="indefinite" restart="never" nodeType="tmRoot"/>
+      </p:par>
+    </p:tnLst>
+  </p:timing>
 </p:sld>
 </file>
 
@@ -6214,56 +6658,164 @@
       </p:grpSpPr>
       <p:sp>
         <p:nvSpPr>
-          <p:cNvPr id="2" name="Titolo 1"/>
-          <p:cNvSpPr>
-            <a:spLocks noGrp="1"/>
-          </p:cNvSpPr>
-          <p:nvPr>
-            <p:ph type="title"/>
-          </p:nvPr>
-        </p:nvSpPr>
-        <p:spPr/>
-        <p:txBody>
-          <a:bodyPr/>
-          <a:lstStyle/>
-          <a:p>
-            <a:endParaRPr lang="it-IT"/>
-          </a:p>
-        </p:txBody>
-      </p:sp>
-      <p:sp>
-        <p:nvSpPr>
-          <p:cNvPr id="3" name="Segnaposto contenuto 2"/>
-          <p:cNvSpPr>
-            <a:spLocks noGrp="1"/>
-          </p:cNvSpPr>
-          <p:nvPr>
-            <p:ph idx="1"/>
-          </p:nvPr>
-        </p:nvSpPr>
-        <p:spPr/>
-        <p:txBody>
-          <a:bodyPr/>
-          <a:lstStyle/>
-          <a:p>
-            <a:r>
-              <a:rPr lang="it-IT" dirty="0" smtClean="0"/>
-              <a:t>Slide per la macchina a stati</a:t>
-            </a:r>
+          <p:cNvPr id="4" name="CasellaDiTesto 3"/>
+          <p:cNvSpPr txBox="1"/>
+          <p:nvPr/>
+        </p:nvSpPr>
+        <p:spPr>
+          <a:xfrm>
+            <a:off x="905608" y="589085"/>
+            <a:ext cx="7165731" cy="369332"/>
+          </a:xfrm>
+          <a:prstGeom prst="rect">
+            <a:avLst/>
+          </a:prstGeom>
+          <a:noFill/>
+        </p:spPr>
+        <p:txBody>
+          <a:bodyPr wrap="square" rtlCol="0">
+            <a:spAutoFit/>
+          </a:bodyPr>
+          <a:lstStyle/>
+          <a:p>
             <a:endParaRPr lang="it-IT" dirty="0"/>
           </a:p>
         </p:txBody>
       </p:sp>
+      <p:sp>
+        <p:nvSpPr>
+          <p:cNvPr id="5" name="CasellaDiTesto 4"/>
+          <p:cNvSpPr txBox="1"/>
+          <p:nvPr/>
+        </p:nvSpPr>
+        <p:spPr>
+          <a:xfrm>
+            <a:off x="833681" y="958417"/>
+            <a:ext cx="7165731" cy="461665"/>
+          </a:xfrm>
+          <a:prstGeom prst="rect">
+            <a:avLst/>
+          </a:prstGeom>
+          <a:noFill/>
+        </p:spPr>
+        <p:txBody>
+          <a:bodyPr wrap="square" rtlCol="0">
+            <a:spAutoFit/>
+          </a:bodyPr>
+          <a:lstStyle/>
+          <a:p>
+            <a:r>
+              <a:rPr lang="it-IT" sz="2400" b="1" dirty="0" smtClean="0"/>
+              <a:t>Modifiche al codice del microcontrollore </a:t>
+            </a:r>
+            <a:endParaRPr lang="it-IT" sz="2400" b="1" dirty="0"/>
+          </a:p>
+        </p:txBody>
+      </p:sp>
+      <p:sp>
+        <p:nvSpPr>
+          <p:cNvPr id="7" name="CasellaDiTesto 6"/>
+          <p:cNvSpPr txBox="1"/>
+          <p:nvPr/>
+        </p:nvSpPr>
+        <p:spPr>
+          <a:xfrm>
+            <a:off x="833680" y="2391508"/>
+            <a:ext cx="4283443" cy="3416320"/>
+          </a:xfrm>
+          <a:prstGeom prst="rect">
+            <a:avLst/>
+          </a:prstGeom>
+          <a:noFill/>
+        </p:spPr>
+        <p:txBody>
+          <a:bodyPr wrap="square" rtlCol="0">
+            <a:spAutoFit/>
+          </a:bodyPr>
+          <a:lstStyle/>
+          <a:p>
+            <a:pPr marL="285750" indent="-285750">
+              <a:buFont typeface="Arial" panose="020B0604020202020204" pitchFamily="34" charset="0"/>
+              <a:buChar char="•"/>
+            </a:pPr>
+            <a:r>
+              <a:rPr lang="it-IT" sz="2400" dirty="0" smtClean="0"/>
+              <a:t>Integrazione delle funzioni per l’acquisizione dei dati</a:t>
+            </a:r>
+          </a:p>
+          <a:p>
+            <a:endParaRPr lang="it-IT" sz="2400" dirty="0"/>
+          </a:p>
+          <a:p>
+            <a:endParaRPr lang="it-IT" sz="2400" dirty="0" smtClean="0"/>
+          </a:p>
+          <a:p>
+            <a:pPr marL="285750" indent="-285750">
+              <a:buFont typeface="Arial" panose="020B0604020202020204" pitchFamily="34" charset="0"/>
+              <a:buChar char="•"/>
+            </a:pPr>
+            <a:r>
+              <a:rPr lang="it-IT" sz="2400" dirty="0" smtClean="0"/>
+              <a:t>Drivers per l’accelerometro e il giroscopio</a:t>
+            </a:r>
+            <a:endParaRPr lang="it-IT" sz="2400" dirty="0"/>
+          </a:p>
+          <a:p>
+            <a:pPr marL="285750" indent="-285750">
+              <a:buFont typeface="Arial" panose="020B0604020202020204" pitchFamily="34" charset="0"/>
+              <a:buChar char="•"/>
+            </a:pPr>
+            <a:endParaRPr lang="it-IT" sz="2400" dirty="0" smtClean="0"/>
+          </a:p>
+        </p:txBody>
+      </p:sp>
+      <p:pic>
+        <p:nvPicPr>
+          <p:cNvPr id="2" name="Immagine 1"/>
+          <p:cNvPicPr>
+            <a:picLocks noChangeAspect="1"/>
+          </p:cNvPicPr>
+          <p:nvPr/>
+        </p:nvPicPr>
+        <p:blipFill>
+          <a:blip r:embed="rId2">
+            <a:extLst>
+              <a:ext uri="{28A0092B-C50C-407E-A947-70E740481C1C}">
+                <a14:useLocalDpi xmlns:a14="http://schemas.microsoft.com/office/drawing/2010/main" val="0"/>
+              </a:ext>
+            </a:extLst>
+          </a:blip>
+          <a:stretch>
+            <a:fillRect/>
+          </a:stretch>
+        </p:blipFill>
+        <p:spPr>
+          <a:xfrm>
+            <a:off x="5697415" y="1789414"/>
+            <a:ext cx="5893689" cy="4323301"/>
+          </a:xfrm>
+          <a:prstGeom prst="rect">
+            <a:avLst/>
+          </a:prstGeom>
+        </p:spPr>
+      </p:pic>
     </p:spTree>
     <p:extLst>
       <p:ext uri="{BB962C8B-B14F-4D97-AF65-F5344CB8AC3E}">
-        <p14:creationId xmlns:p14="http://schemas.microsoft.com/office/powerpoint/2010/main" val="2045395592"/>
+        <p14:creationId xmlns:p14="http://schemas.microsoft.com/office/powerpoint/2010/main" val="2911079430"/>
       </p:ext>
     </p:extLst>
   </p:cSld>
   <p:clrMapOvr>
     <a:masterClrMapping/>
   </p:clrMapOvr>
+  <p:timing>
+    <p:tnLst>
+      <p:par>
+        <p:cTn id="1" dur="indefinite" restart="never" nodeType="tmRoot"/>
+      </p:par>
+    </p:tnLst>
+  </p:timing>
 </p:sld>
 </file>
 
@@ -6286,56 +6838,169 @@
       </p:grpSpPr>
       <p:sp>
         <p:nvSpPr>
-          <p:cNvPr id="2" name="Titolo 1"/>
-          <p:cNvSpPr>
-            <a:spLocks noGrp="1"/>
-          </p:cNvSpPr>
-          <p:nvPr>
-            <p:ph type="title"/>
-          </p:nvPr>
-        </p:nvSpPr>
-        <p:spPr/>
-        <p:txBody>
-          <a:bodyPr/>
-          <a:lstStyle/>
-          <a:p>
-            <a:endParaRPr lang="it-IT"/>
-          </a:p>
-        </p:txBody>
-      </p:sp>
-      <p:sp>
-        <p:nvSpPr>
-          <p:cNvPr id="3" name="Segnaposto contenuto 2"/>
-          <p:cNvSpPr>
-            <a:spLocks noGrp="1"/>
-          </p:cNvSpPr>
-          <p:nvPr>
-            <p:ph idx="1"/>
-          </p:nvPr>
-        </p:nvSpPr>
-        <p:spPr/>
-        <p:txBody>
-          <a:bodyPr/>
-          <a:lstStyle/>
-          <a:p>
-            <a:r>
-              <a:rPr lang="it-IT" dirty="0" smtClean="0"/>
-              <a:t>Slide per modifiche del buffer (?)</a:t>
-            </a:r>
+          <p:cNvPr id="4" name="CasellaDiTesto 3"/>
+          <p:cNvSpPr txBox="1"/>
+          <p:nvPr/>
+        </p:nvSpPr>
+        <p:spPr>
+          <a:xfrm>
+            <a:off x="905608" y="589085"/>
+            <a:ext cx="7165731" cy="369332"/>
+          </a:xfrm>
+          <a:prstGeom prst="rect">
+            <a:avLst/>
+          </a:prstGeom>
+          <a:noFill/>
+        </p:spPr>
+        <p:txBody>
+          <a:bodyPr wrap="square" rtlCol="0">
+            <a:spAutoFit/>
+          </a:bodyPr>
+          <a:lstStyle/>
+          <a:p>
             <a:endParaRPr lang="it-IT" dirty="0"/>
           </a:p>
         </p:txBody>
       </p:sp>
+      <p:sp>
+        <p:nvSpPr>
+          <p:cNvPr id="5" name="CasellaDiTesto 4"/>
+          <p:cNvSpPr txBox="1"/>
+          <p:nvPr/>
+        </p:nvSpPr>
+        <p:spPr>
+          <a:xfrm>
+            <a:off x="833681" y="958417"/>
+            <a:ext cx="7165731" cy="461665"/>
+          </a:xfrm>
+          <a:prstGeom prst="rect">
+            <a:avLst/>
+          </a:prstGeom>
+          <a:noFill/>
+        </p:spPr>
+        <p:txBody>
+          <a:bodyPr wrap="square" rtlCol="0">
+            <a:spAutoFit/>
+          </a:bodyPr>
+          <a:lstStyle/>
+          <a:p>
+            <a:r>
+              <a:rPr lang="it-IT" sz="2400" b="1" dirty="0" smtClean="0"/>
+              <a:t>Modifiche al codice del microcontrollore </a:t>
+            </a:r>
+            <a:endParaRPr lang="it-IT" sz="2400" b="1" dirty="0"/>
+          </a:p>
+        </p:txBody>
+      </p:sp>
+      <p:sp>
+        <p:nvSpPr>
+          <p:cNvPr id="7" name="CasellaDiTesto 6"/>
+          <p:cNvSpPr txBox="1"/>
+          <p:nvPr/>
+        </p:nvSpPr>
+        <p:spPr>
+          <a:xfrm>
+            <a:off x="833681" y="2391508"/>
+            <a:ext cx="3940542" cy="2308324"/>
+          </a:xfrm>
+          <a:prstGeom prst="rect">
+            <a:avLst/>
+          </a:prstGeom>
+          <a:noFill/>
+        </p:spPr>
+        <p:txBody>
+          <a:bodyPr wrap="square" rtlCol="0">
+            <a:spAutoFit/>
+          </a:bodyPr>
+          <a:lstStyle/>
+          <a:p>
+            <a:pPr marL="285750" indent="-285750">
+              <a:buFont typeface="Arial" panose="020B0604020202020204" pitchFamily="34" charset="0"/>
+              <a:buChar char="•"/>
+            </a:pPr>
+            <a:r>
+              <a:rPr lang="it-IT" sz="2400" dirty="0" smtClean="0"/>
+              <a:t>Modifica della struttura dati </a:t>
+            </a:r>
+            <a:r>
+              <a:rPr lang="it-IT" sz="2400" dirty="0" err="1" smtClean="0"/>
+              <a:t>sensor_t</a:t>
+            </a:r>
+            <a:r>
+              <a:rPr lang="it-IT" sz="2400" dirty="0"/>
+              <a:t> </a:t>
+            </a:r>
+          </a:p>
+          <a:p>
+            <a:pPr marL="285750" indent="-285750">
+              <a:buFont typeface="Arial" panose="020B0604020202020204" pitchFamily="34" charset="0"/>
+              <a:buChar char="•"/>
+            </a:pPr>
+            <a:endParaRPr lang="it-IT" sz="2400" dirty="0" smtClean="0"/>
+          </a:p>
+          <a:p>
+            <a:endParaRPr lang="it-IT" sz="2400" dirty="0" smtClean="0"/>
+          </a:p>
+          <a:p>
+            <a:pPr marL="285750" indent="-285750">
+              <a:buFont typeface="Arial" panose="020B0604020202020204" pitchFamily="34" charset="0"/>
+              <a:buChar char="•"/>
+            </a:pPr>
+            <a:r>
+              <a:rPr lang="it-IT" sz="2400" dirty="0" smtClean="0"/>
+              <a:t>Aggiunta delle nuove variabili di interesse</a:t>
+            </a:r>
+            <a:endParaRPr lang="it-IT" sz="2400" dirty="0"/>
+          </a:p>
+        </p:txBody>
+      </p:sp>
+      <p:pic>
+        <p:nvPicPr>
+          <p:cNvPr id="8" name="Immagine 7"/>
+          <p:cNvPicPr>
+            <a:picLocks noChangeAspect="1"/>
+          </p:cNvPicPr>
+          <p:nvPr/>
+        </p:nvPicPr>
+        <p:blipFill>
+          <a:blip r:embed="rId2">
+            <a:extLst>
+              <a:ext uri="{28A0092B-C50C-407E-A947-70E740481C1C}">
+                <a14:useLocalDpi xmlns:a14="http://schemas.microsoft.com/office/drawing/2010/main" val="0"/>
+              </a:ext>
+            </a:extLst>
+          </a:blip>
+          <a:stretch>
+            <a:fillRect/>
+          </a:stretch>
+        </p:blipFill>
+        <p:spPr>
+          <a:xfrm>
+            <a:off x="5700483" y="1725956"/>
+            <a:ext cx="5984494" cy="3808315"/>
+          </a:xfrm>
+          <a:prstGeom prst="rect">
+            <a:avLst/>
+          </a:prstGeom>
+        </p:spPr>
+      </p:pic>
     </p:spTree>
     <p:extLst>
       <p:ext uri="{BB962C8B-B14F-4D97-AF65-F5344CB8AC3E}">
-        <p14:creationId xmlns:p14="http://schemas.microsoft.com/office/powerpoint/2010/main" val="1640581264"/>
+        <p14:creationId xmlns:p14="http://schemas.microsoft.com/office/powerpoint/2010/main" val="3567082170"/>
       </p:ext>
     </p:extLst>
   </p:cSld>
   <p:clrMapOvr>
     <a:masterClrMapping/>
   </p:clrMapOvr>
+  <p:timing>
+    <p:tnLst>
+      <p:par>
+        <p:cTn id="1" dur="indefinite" restart="never" nodeType="tmRoot"/>
+      </p:par>
+    </p:tnLst>
+  </p:timing>
 </p:sld>
 </file>
 
@@ -6358,56 +7023,376 @@
       </p:grpSpPr>
       <p:sp>
         <p:nvSpPr>
-          <p:cNvPr id="2" name="Titolo 1"/>
-          <p:cNvSpPr>
-            <a:spLocks noGrp="1"/>
-          </p:cNvSpPr>
-          <p:nvPr>
-            <p:ph type="title"/>
-          </p:nvPr>
-        </p:nvSpPr>
-        <p:spPr/>
-        <p:txBody>
-          <a:bodyPr/>
-          <a:lstStyle/>
-          <a:p>
-            <a:endParaRPr lang="it-IT"/>
-          </a:p>
-        </p:txBody>
-      </p:sp>
-      <p:sp>
-        <p:nvSpPr>
-          <p:cNvPr id="3" name="Segnaposto contenuto 2"/>
-          <p:cNvSpPr>
-            <a:spLocks noGrp="1"/>
-          </p:cNvSpPr>
-          <p:nvPr>
-            <p:ph idx="1"/>
-          </p:nvPr>
-        </p:nvSpPr>
-        <p:spPr/>
-        <p:txBody>
-          <a:bodyPr/>
-          <a:lstStyle/>
-          <a:p>
-            <a:r>
-              <a:rPr lang="it-IT" dirty="0" smtClean="0"/>
-              <a:t>Ringraziamenti e crediti</a:t>
-            </a:r>
+          <p:cNvPr id="4" name="CasellaDiTesto 3"/>
+          <p:cNvSpPr txBox="1"/>
+          <p:nvPr/>
+        </p:nvSpPr>
+        <p:spPr>
+          <a:xfrm>
+            <a:off x="905608" y="589085"/>
+            <a:ext cx="7165731" cy="369332"/>
+          </a:xfrm>
+          <a:prstGeom prst="rect">
+            <a:avLst/>
+          </a:prstGeom>
+          <a:noFill/>
+        </p:spPr>
+        <p:txBody>
+          <a:bodyPr wrap="square" rtlCol="0">
+            <a:spAutoFit/>
+          </a:bodyPr>
+          <a:lstStyle/>
+          <a:p>
             <a:endParaRPr lang="it-IT" dirty="0"/>
           </a:p>
         </p:txBody>
       </p:sp>
+      <p:sp>
+        <p:nvSpPr>
+          <p:cNvPr id="5" name="CasellaDiTesto 4"/>
+          <p:cNvSpPr txBox="1"/>
+          <p:nvPr/>
+        </p:nvSpPr>
+        <p:spPr>
+          <a:xfrm>
+            <a:off x="905608" y="958417"/>
+            <a:ext cx="7165731" cy="461665"/>
+          </a:xfrm>
+          <a:prstGeom prst="rect">
+            <a:avLst/>
+          </a:prstGeom>
+          <a:noFill/>
+        </p:spPr>
+        <p:txBody>
+          <a:bodyPr wrap="square" rtlCol="0">
+            <a:spAutoFit/>
+          </a:bodyPr>
+          <a:lstStyle/>
+          <a:p>
+            <a:r>
+              <a:rPr lang="it-IT" sz="2400" b="1" dirty="0" smtClean="0"/>
+              <a:t>Modifiche al codice del microcontrollore </a:t>
+            </a:r>
+            <a:endParaRPr lang="it-IT" sz="2400" b="1" dirty="0"/>
+          </a:p>
+        </p:txBody>
+      </p:sp>
+      <p:sp>
+        <p:nvSpPr>
+          <p:cNvPr id="7" name="CasellaDiTesto 6"/>
+          <p:cNvSpPr txBox="1"/>
+          <p:nvPr/>
+        </p:nvSpPr>
+        <p:spPr>
+          <a:xfrm>
+            <a:off x="536332" y="2430675"/>
+            <a:ext cx="4554416" cy="3046988"/>
+          </a:xfrm>
+          <a:prstGeom prst="rect">
+            <a:avLst/>
+          </a:prstGeom>
+          <a:noFill/>
+        </p:spPr>
+        <p:txBody>
+          <a:bodyPr wrap="square" rtlCol="0">
+            <a:spAutoFit/>
+          </a:bodyPr>
+          <a:lstStyle/>
+          <a:p>
+            <a:pPr marL="285750" indent="-285750">
+              <a:buFont typeface="Arial" panose="020B0604020202020204" pitchFamily="34" charset="0"/>
+              <a:buChar char="•"/>
+            </a:pPr>
+            <a:r>
+              <a:rPr lang="it-IT" sz="2400" dirty="0" smtClean="0"/>
+              <a:t>Modifica della funzione </a:t>
+            </a:r>
+            <a:r>
+              <a:rPr lang="it-IT" sz="2400" dirty="0" err="1" smtClean="0"/>
+              <a:t>EnvSensors_Read</a:t>
+            </a:r>
+            <a:r>
+              <a:rPr lang="it-IT" sz="2400" dirty="0" smtClean="0"/>
+              <a:t>()</a:t>
+            </a:r>
+          </a:p>
+          <a:p>
+            <a:pPr marL="285750" indent="-285750">
+              <a:buFont typeface="Arial" panose="020B0604020202020204" pitchFamily="34" charset="0"/>
+              <a:buChar char="•"/>
+            </a:pPr>
+            <a:endParaRPr lang="it-IT" sz="2400" dirty="0"/>
+          </a:p>
+          <a:p>
+            <a:endParaRPr lang="it-IT" sz="2400" dirty="0" smtClean="0"/>
+          </a:p>
+          <a:p>
+            <a:pPr marL="285750" indent="-285750">
+              <a:buFont typeface="Arial" panose="020B0604020202020204" pitchFamily="34" charset="0"/>
+              <a:buChar char="•"/>
+            </a:pPr>
+            <a:r>
+              <a:rPr lang="it-IT" sz="2400" dirty="0" smtClean="0"/>
+              <a:t>Acquisizione dei dati dei sensori nella struttura dati </a:t>
+            </a:r>
+            <a:r>
+              <a:rPr lang="it-IT" sz="2400" dirty="0" err="1"/>
+              <a:t>s</a:t>
+            </a:r>
+            <a:r>
+              <a:rPr lang="it-IT" sz="2400" dirty="0" err="1" smtClean="0"/>
+              <a:t>ensor_data</a:t>
+            </a:r>
+            <a:endParaRPr lang="it-IT" sz="2400" dirty="0"/>
+          </a:p>
+          <a:p>
+            <a:endParaRPr lang="it-IT" sz="2400" dirty="0" smtClean="0"/>
+          </a:p>
+        </p:txBody>
+      </p:sp>
+      <p:pic>
+        <p:nvPicPr>
+          <p:cNvPr id="2" name="Immagine 1"/>
+          <p:cNvPicPr>
+            <a:picLocks noChangeAspect="1"/>
+          </p:cNvPicPr>
+          <p:nvPr/>
+        </p:nvPicPr>
+        <p:blipFill>
+          <a:blip r:embed="rId2">
+            <a:extLst>
+              <a:ext uri="{28A0092B-C50C-407E-A947-70E740481C1C}">
+                <a14:useLocalDpi xmlns:a14="http://schemas.microsoft.com/office/drawing/2010/main" val="0"/>
+              </a:ext>
+            </a:extLst>
+          </a:blip>
+          <a:stretch>
+            <a:fillRect/>
+          </a:stretch>
+        </p:blipFill>
+        <p:spPr>
+          <a:xfrm>
+            <a:off x="5336931" y="2024171"/>
+            <a:ext cx="6515100" cy="3180875"/>
+          </a:xfrm>
+          <a:prstGeom prst="rect">
+            <a:avLst/>
+          </a:prstGeom>
+        </p:spPr>
+      </p:pic>
     </p:spTree>
     <p:extLst>
       <p:ext uri="{BB962C8B-B14F-4D97-AF65-F5344CB8AC3E}">
-        <p14:creationId xmlns:p14="http://schemas.microsoft.com/office/powerpoint/2010/main" val="457155859"/>
+        <p14:creationId xmlns:p14="http://schemas.microsoft.com/office/powerpoint/2010/main" val="2968217483"/>
       </p:ext>
     </p:extLst>
   </p:cSld>
   <p:clrMapOvr>
     <a:masterClrMapping/>
   </p:clrMapOvr>
+  <p:timing>
+    <p:tnLst>
+      <p:par>
+        <p:cTn id="1" dur="indefinite" restart="never" nodeType="tmRoot"/>
+      </p:par>
+    </p:tnLst>
+  </p:timing>
+</p:sld>
+</file>
+
+<file path=ppt/slides/slide9.xml><?xml version="1.0" encoding="utf-8"?>
+<p:sld xmlns:a="http://schemas.openxmlformats.org/drawingml/2006/main" xmlns:r="http://schemas.openxmlformats.org/officeDocument/2006/relationships" xmlns:p="http://schemas.openxmlformats.org/presentationml/2006/main">
+  <p:cSld>
+    <p:spTree>
+      <p:nvGrpSpPr>
+        <p:cNvPr id="1" name=""/>
+        <p:cNvGrpSpPr/>
+        <p:nvPr/>
+      </p:nvGrpSpPr>
+      <p:grpSpPr>
+        <a:xfrm>
+          <a:off x="0" y="0"/>
+          <a:ext cx="0" cy="0"/>
+          <a:chOff x="0" y="0"/>
+          <a:chExt cx="0" cy="0"/>
+        </a:xfrm>
+      </p:grpSpPr>
+      <p:sp>
+        <p:nvSpPr>
+          <p:cNvPr id="4" name="CasellaDiTesto 3"/>
+          <p:cNvSpPr txBox="1"/>
+          <p:nvPr/>
+        </p:nvSpPr>
+        <p:spPr>
+          <a:xfrm>
+            <a:off x="905608" y="589085"/>
+            <a:ext cx="7165731" cy="369332"/>
+          </a:xfrm>
+          <a:prstGeom prst="rect">
+            <a:avLst/>
+          </a:prstGeom>
+          <a:noFill/>
+        </p:spPr>
+        <p:txBody>
+          <a:bodyPr wrap="square" rtlCol="0">
+            <a:spAutoFit/>
+          </a:bodyPr>
+          <a:lstStyle/>
+          <a:p>
+            <a:endParaRPr lang="it-IT" dirty="0"/>
+          </a:p>
+        </p:txBody>
+      </p:sp>
+      <p:sp>
+        <p:nvSpPr>
+          <p:cNvPr id="5" name="CasellaDiTesto 4"/>
+          <p:cNvSpPr txBox="1"/>
+          <p:nvPr/>
+        </p:nvSpPr>
+        <p:spPr>
+          <a:xfrm>
+            <a:off x="905608" y="958417"/>
+            <a:ext cx="7165731" cy="461665"/>
+          </a:xfrm>
+          <a:prstGeom prst="rect">
+            <a:avLst/>
+          </a:prstGeom>
+          <a:noFill/>
+        </p:spPr>
+        <p:txBody>
+          <a:bodyPr wrap="square" rtlCol="0">
+            <a:spAutoFit/>
+          </a:bodyPr>
+          <a:lstStyle/>
+          <a:p>
+            <a:r>
+              <a:rPr lang="it-IT" sz="2400" b="1" dirty="0" smtClean="0"/>
+              <a:t>Modifiche al codice del microcontrollore </a:t>
+            </a:r>
+            <a:endParaRPr lang="it-IT" sz="2400" b="1" dirty="0"/>
+          </a:p>
+        </p:txBody>
+      </p:sp>
+      <p:sp>
+        <p:nvSpPr>
+          <p:cNvPr id="7" name="CasellaDiTesto 6"/>
+          <p:cNvSpPr txBox="1"/>
+          <p:nvPr/>
+        </p:nvSpPr>
+        <p:spPr>
+          <a:xfrm>
+            <a:off x="536332" y="2430675"/>
+            <a:ext cx="4703883" cy="3416320"/>
+          </a:xfrm>
+          <a:prstGeom prst="rect">
+            <a:avLst/>
+          </a:prstGeom>
+          <a:noFill/>
+        </p:spPr>
+        <p:txBody>
+          <a:bodyPr wrap="square" rtlCol="0">
+            <a:spAutoFit/>
+          </a:bodyPr>
+          <a:lstStyle/>
+          <a:p>
+            <a:pPr marL="285750" indent="-285750">
+              <a:buFont typeface="Arial" panose="020B0604020202020204" pitchFamily="34" charset="0"/>
+              <a:buChar char="•"/>
+            </a:pPr>
+            <a:r>
+              <a:rPr lang="it-IT" sz="2400" dirty="0" smtClean="0"/>
+              <a:t>Modifica della funzione </a:t>
+            </a:r>
+            <a:r>
+              <a:rPr lang="it-IT" sz="2400" dirty="0" err="1" smtClean="0"/>
+              <a:t>SendTxData</a:t>
+            </a:r>
+            <a:r>
+              <a:rPr lang="it-IT" sz="2400" dirty="0" smtClean="0"/>
+              <a:t>() per comunicazione </a:t>
+            </a:r>
+            <a:r>
+              <a:rPr lang="it-IT" sz="2400" b="1" dirty="0" err="1" smtClean="0"/>
+              <a:t>uplink</a:t>
+            </a:r>
+            <a:endParaRPr lang="it-IT" sz="2400" b="1" dirty="0" smtClean="0"/>
+          </a:p>
+          <a:p>
+            <a:pPr marL="285750" indent="-285750">
+              <a:buFont typeface="Arial" panose="020B0604020202020204" pitchFamily="34" charset="0"/>
+              <a:buChar char="•"/>
+            </a:pPr>
+            <a:endParaRPr lang="it-IT" sz="2400" dirty="0"/>
+          </a:p>
+          <a:p>
+            <a:endParaRPr lang="it-IT" sz="2400" dirty="0" smtClean="0"/>
+          </a:p>
+          <a:p>
+            <a:pPr marL="285750" indent="-285750">
+              <a:buFont typeface="Arial" panose="020B0604020202020204" pitchFamily="34" charset="0"/>
+              <a:buChar char="•"/>
+            </a:pPr>
+            <a:r>
+              <a:rPr lang="it-IT" sz="2400" dirty="0" smtClean="0"/>
+              <a:t>Organizzazione dei dati nel buffer</a:t>
+            </a:r>
+            <a:endParaRPr lang="it-IT" sz="2400" dirty="0"/>
+          </a:p>
+          <a:p>
+            <a:endParaRPr lang="it-IT" sz="2400" dirty="0" smtClean="0"/>
+          </a:p>
+          <a:p>
+            <a:endParaRPr lang="it-IT" sz="2400" dirty="0" smtClean="0"/>
+          </a:p>
+        </p:txBody>
+      </p:sp>
+      <p:pic>
+        <p:nvPicPr>
+          <p:cNvPr id="6" name="Immagine 5"/>
+          <p:cNvPicPr>
+            <a:picLocks noChangeAspect="1"/>
+          </p:cNvPicPr>
+          <p:nvPr/>
+        </p:nvPicPr>
+        <p:blipFill>
+          <a:blip r:embed="rId2">
+            <a:extLst>
+              <a:ext uri="{28A0092B-C50C-407E-A947-70E740481C1C}">
+                <a14:useLocalDpi xmlns:a14="http://schemas.microsoft.com/office/drawing/2010/main" val="0"/>
+              </a:ext>
+            </a:extLst>
+          </a:blip>
+          <a:stretch>
+            <a:fillRect/>
+          </a:stretch>
+        </p:blipFill>
+        <p:spPr>
+          <a:xfrm>
+            <a:off x="5584103" y="1701491"/>
+            <a:ext cx="6071462" cy="4503267"/>
+          </a:xfrm>
+          <a:prstGeom prst="rect">
+            <a:avLst/>
+          </a:prstGeom>
+        </p:spPr>
+      </p:pic>
+    </p:spTree>
+    <p:extLst>
+      <p:ext uri="{BB962C8B-B14F-4D97-AF65-F5344CB8AC3E}">
+        <p14:creationId xmlns:p14="http://schemas.microsoft.com/office/powerpoint/2010/main" val="3612410788"/>
+      </p:ext>
+    </p:extLst>
+  </p:cSld>
+  <p:clrMapOvr>
+    <a:masterClrMapping/>
+  </p:clrMapOvr>
+  <p:timing>
+    <p:tnLst>
+      <p:par>
+        <p:cTn id="1" dur="indefinite" restart="never" nodeType="tmRoot"/>
+      </p:par>
+    </p:tnLst>
+  </p:timing>
 </p:sld>
 </file>
 

</xml_diff>